<commit_message>
[6125] Update about.jsp to match team make up at Oct 2016
</commit_message>
<xml_diff>
--- a/src/main/webapp/mockups/processed photo sample.pptx
+++ b/src/main/webapp/mockups/processed photo sample.pptx
@@ -288,7 +288,7 @@
           <a:p>
             <a:fld id="{9EDCAED8-956B-1E47-BC3B-A7C5FFBA6198}" type="datetimeFigureOut">
               <a:rPr lang="en-US" smtClean="0"/>
-              <a:t>5/2/2014</a:t>
+              <a:t>10/30/2016</a:t>
             </a:fld>
             <a:endParaRPr lang="en-US"/>
           </a:p>
@@ -458,7 +458,7 @@
           <a:p>
             <a:fld id="{9EDCAED8-956B-1E47-BC3B-A7C5FFBA6198}" type="datetimeFigureOut">
               <a:rPr lang="en-US" smtClean="0"/>
-              <a:t>5/2/2014</a:t>
+              <a:t>10/30/2016</a:t>
             </a:fld>
             <a:endParaRPr lang="en-US"/>
           </a:p>
@@ -638,7 +638,7 @@
           <a:p>
             <a:fld id="{9EDCAED8-956B-1E47-BC3B-A7C5FFBA6198}" type="datetimeFigureOut">
               <a:rPr lang="en-US" smtClean="0"/>
-              <a:t>5/2/2014</a:t>
+              <a:t>10/30/2016</a:t>
             </a:fld>
             <a:endParaRPr lang="en-US"/>
           </a:p>
@@ -808,7 +808,7 @@
           <a:p>
             <a:fld id="{9EDCAED8-956B-1E47-BC3B-A7C5FFBA6198}" type="datetimeFigureOut">
               <a:rPr lang="en-US" smtClean="0"/>
-              <a:t>5/2/2014</a:t>
+              <a:t>10/30/2016</a:t>
             </a:fld>
             <a:endParaRPr lang="en-US"/>
           </a:p>
@@ -1054,7 +1054,7 @@
           <a:p>
             <a:fld id="{9EDCAED8-956B-1E47-BC3B-A7C5FFBA6198}" type="datetimeFigureOut">
               <a:rPr lang="en-US" smtClean="0"/>
-              <a:t>5/2/2014</a:t>
+              <a:t>10/30/2016</a:t>
             </a:fld>
             <a:endParaRPr lang="en-US"/>
           </a:p>
@@ -1342,7 +1342,7 @@
           <a:p>
             <a:fld id="{9EDCAED8-956B-1E47-BC3B-A7C5FFBA6198}" type="datetimeFigureOut">
               <a:rPr lang="en-US" smtClean="0"/>
-              <a:t>5/2/2014</a:t>
+              <a:t>10/30/2016</a:t>
             </a:fld>
             <a:endParaRPr lang="en-US"/>
           </a:p>
@@ -1764,7 +1764,7 @@
           <a:p>
             <a:fld id="{9EDCAED8-956B-1E47-BC3B-A7C5FFBA6198}" type="datetimeFigureOut">
               <a:rPr lang="en-US" smtClean="0"/>
-              <a:t>5/2/2014</a:t>
+              <a:t>10/30/2016</a:t>
             </a:fld>
             <a:endParaRPr lang="en-US"/>
           </a:p>
@@ -1882,7 +1882,7 @@
           <a:p>
             <a:fld id="{9EDCAED8-956B-1E47-BC3B-A7C5FFBA6198}" type="datetimeFigureOut">
               <a:rPr lang="en-US" smtClean="0"/>
-              <a:t>5/2/2014</a:t>
+              <a:t>10/30/2016</a:t>
             </a:fld>
             <a:endParaRPr lang="en-US"/>
           </a:p>
@@ -1977,7 +1977,7 @@
           <a:p>
             <a:fld id="{9EDCAED8-956B-1E47-BC3B-A7C5FFBA6198}" type="datetimeFigureOut">
               <a:rPr lang="en-US" smtClean="0"/>
-              <a:t>5/2/2014</a:t>
+              <a:t>10/30/2016</a:t>
             </a:fld>
             <a:endParaRPr lang="en-US"/>
           </a:p>
@@ -2254,7 +2254,7 @@
           <a:p>
             <a:fld id="{9EDCAED8-956B-1E47-BC3B-A7C5FFBA6198}" type="datetimeFigureOut">
               <a:rPr lang="en-US" smtClean="0"/>
-              <a:t>5/2/2014</a:t>
+              <a:t>10/30/2016</a:t>
             </a:fld>
             <a:endParaRPr lang="en-US"/>
           </a:p>
@@ -2507,7 +2507,7 @@
           <a:p>
             <a:fld id="{9EDCAED8-956B-1E47-BC3B-A7C5FFBA6198}" type="datetimeFigureOut">
               <a:rPr lang="en-US" smtClean="0"/>
-              <a:t>5/2/2014</a:t>
+              <a:t>10/30/2016</a:t>
             </a:fld>
             <a:endParaRPr lang="en-US"/>
           </a:p>
@@ -2720,7 +2720,7 @@
           <a:p>
             <a:fld id="{9EDCAED8-956B-1E47-BC3B-A7C5FFBA6198}" type="datetimeFigureOut">
               <a:rPr lang="en-US" smtClean="0"/>
-              <a:t>5/2/2014</a:t>
+              <a:t>10/30/2016</a:t>
             </a:fld>
             <a:endParaRPr lang="en-US"/>
           </a:p>
@@ -3231,6 +3231,7 @@
             <a:ln>
               <a:noFill/>
             </a:ln>
+            <a:effectLst/>
           </p:spPr>
           <p:style>
             <a:lnRef idx="1">

</xml_diff>